<commit_message>
Add list payment all each Table by Id table
</commit_message>
<xml_diff>
--- a/Restuarant-UML.pptx
+++ b/Restuarant-UML.pptx
@@ -10,7 +10,6 @@
     <p:sldId id="259" r:id="rId4"/>
     <p:sldId id="260" r:id="rId5"/>
     <p:sldId id="261" r:id="rId6"/>
-    <p:sldId id="262" r:id="rId7"/>
   </p:sldIdLst>
   <p:sldSz cx="12192000" cy="6858000"/>
   <p:notesSz cx="6858000" cy="9144000"/>
@@ -246,7 +245,7 @@
           <a:p>
             <a:fld id="{697A96CA-DB9C-4F05-BC5E-EE307CF5B842}" type="datetimeFigureOut">
               <a:rPr lang="en-US" smtClean="0"/>
-              <a:t>6/28/2022</a:t>
+              <a:t>6/29/2022</a:t>
             </a:fld>
             <a:endParaRPr lang="en-US"/>
           </a:p>
@@ -414,7 +413,7 @@
           <a:p>
             <a:fld id="{697A96CA-DB9C-4F05-BC5E-EE307CF5B842}" type="datetimeFigureOut">
               <a:rPr lang="en-US" smtClean="0"/>
-              <a:t>6/28/2022</a:t>
+              <a:t>6/29/2022</a:t>
             </a:fld>
             <a:endParaRPr lang="en-US"/>
           </a:p>
@@ -592,7 +591,7 @@
           <a:p>
             <a:fld id="{697A96CA-DB9C-4F05-BC5E-EE307CF5B842}" type="datetimeFigureOut">
               <a:rPr lang="en-US" smtClean="0"/>
-              <a:t>6/28/2022</a:t>
+              <a:t>6/29/2022</a:t>
             </a:fld>
             <a:endParaRPr lang="en-US"/>
           </a:p>
@@ -760,7 +759,7 @@
           <a:p>
             <a:fld id="{697A96CA-DB9C-4F05-BC5E-EE307CF5B842}" type="datetimeFigureOut">
               <a:rPr lang="en-US" smtClean="0"/>
-              <a:t>6/28/2022</a:t>
+              <a:t>6/29/2022</a:t>
             </a:fld>
             <a:endParaRPr lang="en-US"/>
           </a:p>
@@ -1005,7 +1004,7 @@
           <a:p>
             <a:fld id="{697A96CA-DB9C-4F05-BC5E-EE307CF5B842}" type="datetimeFigureOut">
               <a:rPr lang="en-US" smtClean="0"/>
-              <a:t>6/28/2022</a:t>
+              <a:t>6/29/2022</a:t>
             </a:fld>
             <a:endParaRPr lang="en-US"/>
           </a:p>
@@ -1234,7 +1233,7 @@
           <a:p>
             <a:fld id="{697A96CA-DB9C-4F05-BC5E-EE307CF5B842}" type="datetimeFigureOut">
               <a:rPr lang="en-US" smtClean="0"/>
-              <a:t>6/28/2022</a:t>
+              <a:t>6/29/2022</a:t>
             </a:fld>
             <a:endParaRPr lang="en-US"/>
           </a:p>
@@ -1598,7 +1597,7 @@
           <a:p>
             <a:fld id="{697A96CA-DB9C-4F05-BC5E-EE307CF5B842}" type="datetimeFigureOut">
               <a:rPr lang="en-US" smtClean="0"/>
-              <a:t>6/28/2022</a:t>
+              <a:t>6/29/2022</a:t>
             </a:fld>
             <a:endParaRPr lang="en-US"/>
           </a:p>
@@ -1715,7 +1714,7 @@
           <a:p>
             <a:fld id="{697A96CA-DB9C-4F05-BC5E-EE307CF5B842}" type="datetimeFigureOut">
               <a:rPr lang="en-US" smtClean="0"/>
-              <a:t>6/28/2022</a:t>
+              <a:t>6/29/2022</a:t>
             </a:fld>
             <a:endParaRPr lang="en-US"/>
           </a:p>
@@ -1810,7 +1809,7 @@
           <a:p>
             <a:fld id="{697A96CA-DB9C-4F05-BC5E-EE307CF5B842}" type="datetimeFigureOut">
               <a:rPr lang="en-US" smtClean="0"/>
-              <a:t>6/28/2022</a:t>
+              <a:t>6/29/2022</a:t>
             </a:fld>
             <a:endParaRPr lang="en-US"/>
           </a:p>
@@ -2085,7 +2084,7 @@
           <a:p>
             <a:fld id="{697A96CA-DB9C-4F05-BC5E-EE307CF5B842}" type="datetimeFigureOut">
               <a:rPr lang="en-US" smtClean="0"/>
-              <a:t>6/28/2022</a:t>
+              <a:t>6/29/2022</a:t>
             </a:fld>
             <a:endParaRPr lang="en-US"/>
           </a:p>
@@ -2337,7 +2336,7 @@
           <a:p>
             <a:fld id="{697A96CA-DB9C-4F05-BC5E-EE307CF5B842}" type="datetimeFigureOut">
               <a:rPr lang="en-US" smtClean="0"/>
-              <a:t>6/28/2022</a:t>
+              <a:t>6/29/2022</a:t>
             </a:fld>
             <a:endParaRPr lang="en-US"/>
           </a:p>
@@ -2548,7 +2547,7 @@
           <a:p>
             <a:fld id="{697A96CA-DB9C-4F05-BC5E-EE307CF5B842}" type="datetimeFigureOut">
               <a:rPr lang="en-US" smtClean="0"/>
-              <a:t>6/28/2022</a:t>
+              <a:t>6/29/2022</a:t>
             </a:fld>
             <a:endParaRPr lang="en-US"/>
           </a:p>
@@ -4284,7 +4283,7 @@
         <p:spPr>
           <a:xfrm>
             <a:off x="7362807" y="3323520"/>
-            <a:ext cx="613822" cy="369332"/>
+            <a:ext cx="815351" cy="369332"/>
           </a:xfrm>
           <a:prstGeom prst="rect">
             <a:avLst/>
@@ -4299,7 +4298,7 @@
           <a:p>
             <a:r>
               <a:rPr lang="en-US" dirty="0"/>
-              <a:t>Chef</a:t>
+              <a:t>Waiter</a:t>
             </a:r>
           </a:p>
         </p:txBody>
@@ -4478,35 +4477,6 @@
         <p:spPr>
           <a:xfrm>
             <a:off x="9466968" y="2071966"/>
-            <a:ext cx="300082" cy="369332"/>
-          </a:xfrm>
-          <a:prstGeom prst="rect">
-            <a:avLst/>
-          </a:prstGeom>
-          <a:noFill/>
-        </p:spPr>
-        <p:txBody>
-          <a:bodyPr wrap="none" rtlCol="0">
-            <a:spAutoFit/>
-          </a:bodyPr>
-          <a:lstStyle/>
-          <a:p>
-            <a:r>
-              <a:rPr lang="en-US" dirty="0"/>
-              <a:t>*</a:t>
-            </a:r>
-          </a:p>
-        </p:txBody>
-      </p:sp>
-      <p:sp>
-        <p:nvSpPr>
-          <p:cNvPr id="26" name="TextBox 25"/>
-          <p:cNvSpPr txBox="1"/>
-          <p:nvPr/>
-        </p:nvSpPr>
-        <p:spPr>
-          <a:xfrm>
-            <a:off x="9422224" y="3633151"/>
             <a:ext cx="300082" cy="369332"/>
           </a:xfrm>
           <a:prstGeom prst="rect">
@@ -5070,7 +5040,7 @@
         </p:nvSpPr>
         <p:spPr>
           <a:xfrm>
-            <a:off x="7095324" y="4324120"/>
+            <a:off x="7095324" y="4326212"/>
             <a:ext cx="1455313" cy="914400"/>
           </a:xfrm>
           <a:prstGeom prst="rect">
@@ -5101,7 +5071,7 @@
           <a:lstStyle/>
           <a:p>
             <a:pPr algn="ctr"/>
-            <a:endParaRPr lang="en-US"/>
+            <a:endParaRPr lang="en-US" dirty="0"/>
           </a:p>
         </p:txBody>
       </p:sp>
@@ -5144,7 +5114,7 @@
         <p:spPr>
           <a:xfrm>
             <a:off x="7432565" y="4362897"/>
-            <a:ext cx="815351" cy="369332"/>
+            <a:ext cx="613822" cy="369332"/>
           </a:xfrm>
           <a:prstGeom prst="rect">
             <a:avLst/>
@@ -5159,7 +5129,7 @@
           <a:p>
             <a:r>
               <a:rPr lang="en-US" dirty="0"/>
-              <a:t>Waiter</a:t>
+              <a:t>Chef</a:t>
             </a:r>
           </a:p>
         </p:txBody>
@@ -5989,7 +5959,7 @@
         </p:nvSpPr>
         <p:spPr>
           <a:xfrm>
-            <a:off x="7109774" y="2179163"/>
+            <a:off x="7109774" y="2178976"/>
             <a:ext cx="1455313" cy="914400"/>
           </a:xfrm>
           <a:prstGeom prst="rect">
@@ -6193,49 +6163,6 @@
           <a:xfrm flipV="1">
             <a:off x="8590220" y="3468111"/>
             <a:ext cx="1148201" cy="53144"/>
-          </a:xfrm>
-          <a:prstGeom prst="line">
-            <a:avLst/>
-          </a:prstGeom>
-          <a:ln>
-            <a:solidFill>
-              <a:schemeClr val="tx1"/>
-            </a:solidFill>
-          </a:ln>
-        </p:spPr>
-        <p:style>
-          <a:lnRef idx="1">
-            <a:schemeClr val="accent1"/>
-          </a:lnRef>
-          <a:fillRef idx="0">
-            <a:schemeClr val="accent1"/>
-          </a:fillRef>
-          <a:effectRef idx="0">
-            <a:schemeClr val="accent1"/>
-          </a:effectRef>
-          <a:fontRef idx="minor">
-            <a:schemeClr val="tx1"/>
-          </a:fontRef>
-        </p:style>
-      </p:cxnSp>
-      <p:cxnSp>
-        <p:nvCxnSpPr>
-          <p:cNvPr id="139" name="Straight Connector 138">
-            <a:extLst>
-              <a:ext uri="{FF2B5EF4-FFF2-40B4-BE49-F238E27FC236}">
-                <a16:creationId xmlns:a16="http://schemas.microsoft.com/office/drawing/2014/main" id="{F9E9CDA2-8E68-623A-11A4-7FBD93DA1DB5}"/>
-              </a:ext>
-            </a:extLst>
-          </p:cNvPr>
-          <p:cNvCxnSpPr>
-            <a:stCxn id="45" idx="3"/>
-          </p:cNvCxnSpPr>
-          <p:nvPr/>
-        </p:nvCxnSpPr>
-        <p:spPr>
-          <a:xfrm flipV="1">
-            <a:off x="8550637" y="3827489"/>
-            <a:ext cx="1162221" cy="953831"/>
           </a:xfrm>
           <a:prstGeom prst="line">
             <a:avLst/>
@@ -7446,6 +7373,183 @@
           <a:xfrm>
             <a:off x="5931263" y="2503812"/>
             <a:ext cx="0" cy="983623"/>
+          </a:xfrm>
+          <a:prstGeom prst="line">
+            <a:avLst/>
+          </a:prstGeom>
+          <a:ln w="28575">
+            <a:solidFill>
+              <a:schemeClr val="tx1"/>
+            </a:solidFill>
+          </a:ln>
+        </p:spPr>
+        <p:style>
+          <a:lnRef idx="1">
+            <a:schemeClr val="accent1"/>
+          </a:lnRef>
+          <a:fillRef idx="0">
+            <a:schemeClr val="accent1"/>
+          </a:fillRef>
+          <a:effectRef idx="0">
+            <a:schemeClr val="accent1"/>
+          </a:effectRef>
+          <a:fontRef idx="minor">
+            <a:schemeClr val="tx1"/>
+          </a:fontRef>
+        </p:style>
+      </p:cxnSp>
+      <p:sp>
+        <p:nvSpPr>
+          <p:cNvPr id="27" name="Rectangle 26">
+            <a:extLst>
+              <a:ext uri="{FF2B5EF4-FFF2-40B4-BE49-F238E27FC236}">
+                <a16:creationId xmlns:a16="http://schemas.microsoft.com/office/drawing/2014/main" id="{E87F35EC-FE26-9F1D-AC37-60B50DE3380C}"/>
+              </a:ext>
+            </a:extLst>
+          </p:cNvPr>
+          <p:cNvSpPr/>
+          <p:nvPr/>
+        </p:nvSpPr>
+        <p:spPr>
+          <a:xfrm>
+            <a:off x="459662" y="4313715"/>
+            <a:ext cx="2715700" cy="914400"/>
+          </a:xfrm>
+          <a:prstGeom prst="rect">
+            <a:avLst/>
+          </a:prstGeom>
+          <a:ln w="28575"/>
+        </p:spPr>
+        <p:style>
+          <a:lnRef idx="2">
+            <a:schemeClr val="dk1"/>
+          </a:lnRef>
+          <a:fillRef idx="1">
+            <a:schemeClr val="lt1"/>
+          </a:fillRef>
+          <a:effectRef idx="0">
+            <a:schemeClr val="dk1"/>
+          </a:effectRef>
+          <a:fontRef idx="minor">
+            <a:schemeClr val="dk1"/>
+          </a:fontRef>
+        </p:style>
+        <p:txBody>
+          <a:bodyPr rot="0" spcFirstLastPara="0" vertOverflow="overflow" horzOverflow="overflow" vert="horz" wrap="square" lIns="91440" tIns="45720" rIns="91440" bIns="45720" numCol="1" spcCol="0" rtlCol="0" fromWordArt="0" anchor="ctr" anchorCtr="0" forceAA="0" compatLnSpc="1">
+            <a:prstTxWarp prst="textNoShape">
+              <a:avLst/>
+            </a:prstTxWarp>
+            <a:noAutofit/>
+          </a:bodyPr>
+          <a:lstStyle/>
+          <a:p>
+            <a:pPr algn="ctr"/>
+            <a:endParaRPr lang="en-US"/>
+          </a:p>
+        </p:txBody>
+      </p:sp>
+      <p:cxnSp>
+        <p:nvCxnSpPr>
+          <p:cNvPr id="28" name="Straight Connector 27">
+            <a:extLst>
+              <a:ext uri="{FF2B5EF4-FFF2-40B4-BE49-F238E27FC236}">
+                <a16:creationId xmlns:a16="http://schemas.microsoft.com/office/drawing/2014/main" id="{1566069E-FB33-31B3-6D4C-46237436F5BD}"/>
+              </a:ext>
+            </a:extLst>
+          </p:cNvPr>
+          <p:cNvCxnSpPr>
+            <a:stCxn id="27" idx="1"/>
+            <a:endCxn id="27" idx="3"/>
+          </p:cNvCxnSpPr>
+          <p:nvPr/>
+        </p:nvCxnSpPr>
+        <p:spPr>
+          <a:xfrm>
+            <a:off x="459662" y="4770915"/>
+            <a:ext cx="2715700" cy="0"/>
+          </a:xfrm>
+          <a:prstGeom prst="line">
+            <a:avLst/>
+          </a:prstGeom>
+          <a:ln w="28575"/>
+        </p:spPr>
+        <p:style>
+          <a:lnRef idx="2">
+            <a:schemeClr val="dk1"/>
+          </a:lnRef>
+          <a:fillRef idx="1">
+            <a:schemeClr val="lt1"/>
+          </a:fillRef>
+          <a:effectRef idx="0">
+            <a:schemeClr val="dk1"/>
+          </a:effectRef>
+          <a:fontRef idx="minor">
+            <a:schemeClr val="dk1"/>
+          </a:fontRef>
+        </p:style>
+      </p:cxnSp>
+      <p:sp>
+        <p:nvSpPr>
+          <p:cNvPr id="30" name="TextBox 29">
+            <a:extLst>
+              <a:ext uri="{FF2B5EF4-FFF2-40B4-BE49-F238E27FC236}">
+                <a16:creationId xmlns:a16="http://schemas.microsoft.com/office/drawing/2014/main" id="{E7B53C00-B1C8-B954-62E0-12A9C23C87F1}"/>
+              </a:ext>
+            </a:extLst>
+          </p:cNvPr>
+          <p:cNvSpPr txBox="1"/>
+          <p:nvPr/>
+        </p:nvSpPr>
+        <p:spPr>
+          <a:xfrm>
+            <a:off x="1074326" y="4373603"/>
+            <a:ext cx="1517467" cy="369332"/>
+          </a:xfrm>
+          <a:prstGeom prst="rect">
+            <a:avLst/>
+          </a:prstGeom>
+          <a:noFill/>
+        </p:spPr>
+        <p:txBody>
+          <a:bodyPr wrap="none" rtlCol="0">
+            <a:spAutoFit/>
+          </a:bodyPr>
+          <a:lstStyle/>
+          <a:p>
+            <a:r>
+              <a:rPr lang="en-US" b="1" dirty="0" err="1">
+                <a:solidFill>
+                  <a:srgbClr val="0070C0"/>
+                </a:solidFill>
+              </a:rPr>
+              <a:t>OderManager</a:t>
+            </a:r>
+            <a:endParaRPr lang="en-US" b="1" dirty="0">
+              <a:solidFill>
+                <a:srgbClr val="0070C0"/>
+              </a:solidFill>
+            </a:endParaRPr>
+          </a:p>
+        </p:txBody>
+      </p:sp>
+      <p:cxnSp>
+        <p:nvCxnSpPr>
+          <p:cNvPr id="4" name="Straight Connector 3">
+            <a:extLst>
+              <a:ext uri="{FF2B5EF4-FFF2-40B4-BE49-F238E27FC236}">
+                <a16:creationId xmlns:a16="http://schemas.microsoft.com/office/drawing/2014/main" id="{984DDF18-2B04-57EB-28D6-5A544C6512BC}"/>
+              </a:ext>
+            </a:extLst>
+          </p:cNvPr>
+          <p:cNvCxnSpPr>
+            <a:stCxn id="27" idx="3"/>
+          </p:cNvCxnSpPr>
+          <p:nvPr/>
+        </p:nvCxnSpPr>
+        <p:spPr>
+          <a:xfrm>
+            <a:off x="3175362" y="4770915"/>
+            <a:ext cx="1305702" cy="0"/>
           </a:xfrm>
           <a:prstGeom prst="line">
             <a:avLst/>
@@ -9100,7 +9204,7 @@
         <p:spPr>
           <a:xfrm>
             <a:off x="7542545" y="409608"/>
-            <a:ext cx="434734" cy="307777"/>
+            <a:ext cx="276038" cy="307777"/>
           </a:xfrm>
           <a:prstGeom prst="rect">
             <a:avLst/>
@@ -9115,7 +9219,7 @@
           <a:p>
             <a:r>
               <a:rPr lang="en-US" sz="1400" dirty="0"/>
-              <a:t>1/*</a:t>
+              <a:t>1</a:t>
             </a:r>
           </a:p>
         </p:txBody>
@@ -9124,403 +9228,6 @@
     <p:extLst>
       <p:ext uri="{BB962C8B-B14F-4D97-AF65-F5344CB8AC3E}">
         <p14:creationId xmlns:p14="http://schemas.microsoft.com/office/powerpoint/2010/main" val="2047519683"/>
-      </p:ext>
-    </p:extLst>
-  </p:cSld>
-  <p:clrMapOvr>
-    <a:masterClrMapping/>
-  </p:clrMapOvr>
-</p:sld>
-</file>
-
-<file path=ppt/slides/slide6.xml><?xml version="1.0" encoding="utf-8"?>
-<p:sld xmlns:a="http://schemas.openxmlformats.org/drawingml/2006/main" xmlns:r="http://schemas.openxmlformats.org/officeDocument/2006/relationships" xmlns:p="http://schemas.openxmlformats.org/presentationml/2006/main">
-  <p:cSld>
-    <p:spTree>
-      <p:nvGrpSpPr>
-        <p:cNvPr id="1" name=""/>
-        <p:cNvGrpSpPr/>
-        <p:nvPr/>
-      </p:nvGrpSpPr>
-      <p:grpSpPr>
-        <a:xfrm>
-          <a:off x="0" y="0"/>
-          <a:ext cx="0" cy="0"/>
-          <a:chOff x="0" y="0"/>
-          <a:chExt cx="0" cy="0"/>
-        </a:xfrm>
-      </p:grpSpPr>
-      <p:sp>
-        <p:nvSpPr>
-          <p:cNvPr id="67" name="Rectangle 66">
-            <a:extLst>
-              <a:ext uri="{FF2B5EF4-FFF2-40B4-BE49-F238E27FC236}">
-                <a16:creationId xmlns:a16="http://schemas.microsoft.com/office/drawing/2014/main" id="{65B0CEC8-C7DC-C374-2099-D1E148FCE8A4}"/>
-              </a:ext>
-            </a:extLst>
-          </p:cNvPr>
-          <p:cNvSpPr/>
-          <p:nvPr/>
-        </p:nvSpPr>
-        <p:spPr>
-          <a:xfrm>
-            <a:off x="4182354" y="2052975"/>
-            <a:ext cx="2159828" cy="627775"/>
-          </a:xfrm>
-          <a:prstGeom prst="rect">
-            <a:avLst/>
-          </a:prstGeom>
-          <a:solidFill>
-            <a:schemeClr val="tx1">
-              <a:lumMod val="50000"/>
-              <a:lumOff val="50000"/>
-            </a:schemeClr>
-          </a:solidFill>
-        </p:spPr>
-        <p:style>
-          <a:lnRef idx="2">
-            <a:schemeClr val="dk1"/>
-          </a:lnRef>
-          <a:fillRef idx="1">
-            <a:schemeClr val="lt1"/>
-          </a:fillRef>
-          <a:effectRef idx="0">
-            <a:schemeClr val="dk1"/>
-          </a:effectRef>
-          <a:fontRef idx="minor">
-            <a:schemeClr val="dk1"/>
-          </a:fontRef>
-        </p:style>
-        <p:txBody>
-          <a:bodyPr rot="0" spcFirstLastPara="0" vertOverflow="overflow" horzOverflow="overflow" vert="horz" wrap="square" lIns="91440" tIns="45720" rIns="91440" bIns="45720" numCol="1" spcCol="0" rtlCol="0" fromWordArt="0" anchor="ctr" anchorCtr="0" forceAA="0" compatLnSpc="1">
-            <a:prstTxWarp prst="textNoShape">
-              <a:avLst/>
-            </a:prstTxWarp>
-            <a:noAutofit/>
-          </a:bodyPr>
-          <a:lstStyle/>
-          <a:p>
-            <a:pPr algn="ctr"/>
-            <a:endParaRPr lang="en-US"/>
-          </a:p>
-        </p:txBody>
-      </p:sp>
-      <p:sp>
-        <p:nvSpPr>
-          <p:cNvPr id="69" name="TextBox 68">
-            <a:extLst>
-              <a:ext uri="{FF2B5EF4-FFF2-40B4-BE49-F238E27FC236}">
-                <a16:creationId xmlns:a16="http://schemas.microsoft.com/office/drawing/2014/main" id="{006FE5A5-3F16-1474-A08D-EC256AE58061}"/>
-              </a:ext>
-            </a:extLst>
-          </p:cNvPr>
-          <p:cNvSpPr txBox="1"/>
-          <p:nvPr/>
-        </p:nvSpPr>
-        <p:spPr>
-          <a:xfrm>
-            <a:off x="4955357" y="2076589"/>
-            <a:ext cx="613822" cy="369332"/>
-          </a:xfrm>
-          <a:prstGeom prst="rect">
-            <a:avLst/>
-          </a:prstGeom>
-          <a:noFill/>
-        </p:spPr>
-        <p:txBody>
-          <a:bodyPr wrap="none" rtlCol="0">
-            <a:spAutoFit/>
-          </a:bodyPr>
-          <a:lstStyle/>
-          <a:p>
-            <a:r>
-              <a:rPr lang="en-US" dirty="0"/>
-              <a:t>Chef</a:t>
-            </a:r>
-          </a:p>
-        </p:txBody>
-      </p:sp>
-      <p:sp>
-        <p:nvSpPr>
-          <p:cNvPr id="72" name="Rectangle 71">
-            <a:extLst>
-              <a:ext uri="{FF2B5EF4-FFF2-40B4-BE49-F238E27FC236}">
-                <a16:creationId xmlns:a16="http://schemas.microsoft.com/office/drawing/2014/main" id="{BF66FD28-8729-5AF4-809A-96DFCFCFFC5C}"/>
-              </a:ext>
-            </a:extLst>
-          </p:cNvPr>
-          <p:cNvSpPr/>
-          <p:nvPr/>
-        </p:nvSpPr>
-        <p:spPr>
-          <a:xfrm>
-            <a:off x="4241921" y="441256"/>
-            <a:ext cx="2159828" cy="914400"/>
-          </a:xfrm>
-          <a:prstGeom prst="rect">
-            <a:avLst/>
-          </a:prstGeom>
-        </p:spPr>
-        <p:style>
-          <a:lnRef idx="2">
-            <a:schemeClr val="dk1"/>
-          </a:lnRef>
-          <a:fillRef idx="1">
-            <a:schemeClr val="lt1"/>
-          </a:fillRef>
-          <a:effectRef idx="0">
-            <a:schemeClr val="dk1"/>
-          </a:effectRef>
-          <a:fontRef idx="minor">
-            <a:schemeClr val="dk1"/>
-          </a:fontRef>
-        </p:style>
-        <p:txBody>
-          <a:bodyPr rot="0" spcFirstLastPara="0" vertOverflow="overflow" horzOverflow="overflow" vert="horz" wrap="square" lIns="91440" tIns="45720" rIns="91440" bIns="45720" numCol="1" spcCol="0" rtlCol="0" fromWordArt="0" anchor="ctr" anchorCtr="0" forceAA="0" compatLnSpc="1">
-            <a:prstTxWarp prst="textNoShape">
-              <a:avLst/>
-            </a:prstTxWarp>
-            <a:noAutofit/>
-          </a:bodyPr>
-          <a:lstStyle/>
-          <a:p>
-            <a:pPr algn="ctr"/>
-            <a:endParaRPr lang="en-US"/>
-          </a:p>
-        </p:txBody>
-      </p:sp>
-      <p:cxnSp>
-        <p:nvCxnSpPr>
-          <p:cNvPr id="73" name="Straight Connector 72">
-            <a:extLst>
-              <a:ext uri="{FF2B5EF4-FFF2-40B4-BE49-F238E27FC236}">
-                <a16:creationId xmlns:a16="http://schemas.microsoft.com/office/drawing/2014/main" id="{65BB67AB-2485-519D-0A59-696123777768}"/>
-              </a:ext>
-            </a:extLst>
-          </p:cNvPr>
-          <p:cNvCxnSpPr>
-            <a:stCxn id="72" idx="1"/>
-            <a:endCxn id="72" idx="3"/>
-          </p:cNvCxnSpPr>
-          <p:nvPr/>
-        </p:nvCxnSpPr>
-        <p:spPr>
-          <a:xfrm>
-            <a:off x="4241921" y="898456"/>
-            <a:ext cx="2159828" cy="0"/>
-          </a:xfrm>
-          <a:prstGeom prst="line">
-            <a:avLst/>
-          </a:prstGeom>
-        </p:spPr>
-        <p:style>
-          <a:lnRef idx="2">
-            <a:schemeClr val="dk1"/>
-          </a:lnRef>
-          <a:fillRef idx="1">
-            <a:schemeClr val="lt1"/>
-          </a:fillRef>
-          <a:effectRef idx="0">
-            <a:schemeClr val="dk1"/>
-          </a:effectRef>
-          <a:fontRef idx="minor">
-            <a:schemeClr val="dk1"/>
-          </a:fontRef>
-        </p:style>
-      </p:cxnSp>
-      <p:sp>
-        <p:nvSpPr>
-          <p:cNvPr id="74" name="TextBox 73">
-            <a:extLst>
-              <a:ext uri="{FF2B5EF4-FFF2-40B4-BE49-F238E27FC236}">
-                <a16:creationId xmlns:a16="http://schemas.microsoft.com/office/drawing/2014/main" id="{A258D59D-6743-921F-2464-5F64CF55F504}"/>
-              </a:ext>
-            </a:extLst>
-          </p:cNvPr>
-          <p:cNvSpPr txBox="1"/>
-          <p:nvPr/>
-        </p:nvSpPr>
-        <p:spPr>
-          <a:xfrm>
-            <a:off x="4448919" y="530957"/>
-            <a:ext cx="1759712" cy="369332"/>
-          </a:xfrm>
-          <a:prstGeom prst="rect">
-            <a:avLst/>
-          </a:prstGeom>
-          <a:noFill/>
-        </p:spPr>
-        <p:txBody>
-          <a:bodyPr wrap="none" rtlCol="0">
-            <a:spAutoFit/>
-          </a:bodyPr>
-          <a:lstStyle/>
-          <a:p>
-            <a:r>
-              <a:rPr lang="en-US" b="1" dirty="0" err="1">
-                <a:solidFill>
-                  <a:srgbClr val="0070C0"/>
-                </a:solidFill>
-              </a:rPr>
-              <a:t>KitchenManager</a:t>
-            </a:r>
-            <a:endParaRPr lang="en-US" b="1" dirty="0">
-              <a:solidFill>
-                <a:srgbClr val="0070C0"/>
-              </a:solidFill>
-            </a:endParaRPr>
-          </a:p>
-        </p:txBody>
-      </p:sp>
-      <p:cxnSp>
-        <p:nvCxnSpPr>
-          <p:cNvPr id="83" name="Straight Connector 82">
-            <a:extLst>
-              <a:ext uri="{FF2B5EF4-FFF2-40B4-BE49-F238E27FC236}">
-                <a16:creationId xmlns:a16="http://schemas.microsoft.com/office/drawing/2014/main" id="{738B2C10-9B13-F965-70DE-AAF9A87A40FA}"/>
-              </a:ext>
-            </a:extLst>
-          </p:cNvPr>
-          <p:cNvCxnSpPr/>
-          <p:nvPr/>
-        </p:nvCxnSpPr>
-        <p:spPr>
-          <a:xfrm flipV="1">
-            <a:off x="5323235" y="1369601"/>
-            <a:ext cx="0" cy="669429"/>
-          </a:xfrm>
-          <a:prstGeom prst="line">
-            <a:avLst/>
-          </a:prstGeom>
-        </p:spPr>
-        <p:style>
-          <a:lnRef idx="2">
-            <a:schemeClr val="dk1"/>
-          </a:lnRef>
-          <a:fillRef idx="1">
-            <a:schemeClr val="lt1"/>
-          </a:fillRef>
-          <a:effectRef idx="0">
-            <a:schemeClr val="dk1"/>
-          </a:effectRef>
-          <a:fontRef idx="minor">
-            <a:schemeClr val="dk1"/>
-          </a:fontRef>
-        </p:style>
-      </p:cxnSp>
-      <p:sp>
-        <p:nvSpPr>
-          <p:cNvPr id="84" name="TextBox 83">
-            <a:extLst>
-              <a:ext uri="{FF2B5EF4-FFF2-40B4-BE49-F238E27FC236}">
-                <a16:creationId xmlns:a16="http://schemas.microsoft.com/office/drawing/2014/main" id="{431D9FEE-609A-C45C-0BD7-5A13325A2C50}"/>
-              </a:ext>
-            </a:extLst>
-          </p:cNvPr>
-          <p:cNvSpPr txBox="1"/>
-          <p:nvPr/>
-        </p:nvSpPr>
-        <p:spPr>
-          <a:xfrm>
-            <a:off x="5332758" y="1767086"/>
-            <a:ext cx="274434" cy="307777"/>
-          </a:xfrm>
-          <a:prstGeom prst="rect">
-            <a:avLst/>
-          </a:prstGeom>
-          <a:noFill/>
-        </p:spPr>
-        <p:txBody>
-          <a:bodyPr wrap="none" rtlCol="0">
-            <a:spAutoFit/>
-          </a:bodyPr>
-          <a:lstStyle/>
-          <a:p>
-            <a:r>
-              <a:rPr lang="en-US" sz="1400" dirty="0"/>
-              <a:t>*</a:t>
-            </a:r>
-          </a:p>
-        </p:txBody>
-      </p:sp>
-      <p:sp>
-        <p:nvSpPr>
-          <p:cNvPr id="111" name="TextBox 110">
-            <a:extLst>
-              <a:ext uri="{FF2B5EF4-FFF2-40B4-BE49-F238E27FC236}">
-                <a16:creationId xmlns:a16="http://schemas.microsoft.com/office/drawing/2014/main" id="{D4DA8BB2-19B9-93C4-25C5-7AB428705FDE}"/>
-              </a:ext>
-            </a:extLst>
-          </p:cNvPr>
-          <p:cNvSpPr txBox="1"/>
-          <p:nvPr/>
-        </p:nvSpPr>
-        <p:spPr>
-          <a:xfrm>
-            <a:off x="137573" y="165824"/>
-            <a:ext cx="903004" cy="369332"/>
-          </a:xfrm>
-          <a:prstGeom prst="rect">
-            <a:avLst/>
-          </a:prstGeom>
-          <a:noFill/>
-        </p:spPr>
-        <p:txBody>
-          <a:bodyPr wrap="none" rtlCol="0">
-            <a:spAutoFit/>
-          </a:bodyPr>
-          <a:lstStyle/>
-          <a:p>
-            <a:r>
-              <a:rPr lang="en-US" b="1" dirty="0">
-                <a:solidFill>
-                  <a:schemeClr val="accent1"/>
-                </a:solidFill>
-              </a:rPr>
-              <a:t>Kitchen</a:t>
-            </a:r>
-          </a:p>
-        </p:txBody>
-      </p:sp>
-      <p:sp>
-        <p:nvSpPr>
-          <p:cNvPr id="40" name="TextBox 39">
-            <a:extLst>
-              <a:ext uri="{FF2B5EF4-FFF2-40B4-BE49-F238E27FC236}">
-                <a16:creationId xmlns:a16="http://schemas.microsoft.com/office/drawing/2014/main" id="{C2E6A7C0-D37A-F589-D2B6-20887BEE5DFD}"/>
-              </a:ext>
-            </a:extLst>
-          </p:cNvPr>
-          <p:cNvSpPr txBox="1"/>
-          <p:nvPr/>
-        </p:nvSpPr>
-        <p:spPr>
-          <a:xfrm>
-            <a:off x="4695491" y="1674498"/>
-            <a:ext cx="613822" cy="369332"/>
-          </a:xfrm>
-          <a:prstGeom prst="rect">
-            <a:avLst/>
-          </a:prstGeom>
-          <a:noFill/>
-        </p:spPr>
-        <p:txBody>
-          <a:bodyPr wrap="none" rtlCol="0">
-            <a:spAutoFit/>
-          </a:bodyPr>
-          <a:lstStyle/>
-          <a:p>
-            <a:r>
-              <a:rPr lang="en-US" dirty="0"/>
-              <a:t>Chef</a:t>
-            </a:r>
-          </a:p>
-        </p:txBody>
-      </p:sp>
-    </p:spTree>
-    <p:extLst>
-      <p:ext uri="{BB962C8B-B14F-4D97-AF65-F5344CB8AC3E}">
-        <p14:creationId xmlns:p14="http://schemas.microsoft.com/office/powerpoint/2010/main" val="730893350"/>
       </p:ext>
     </p:extLst>
   </p:cSld>

</xml_diff>